<commit_message>
developed a graph in slides.
</commit_message>
<xml_diff>
--- a/Mini-project midterm report-.pptx
+++ b/Mini-project midterm report-.pptx
@@ -7214,34 +7214,6 @@
           <a:chExt cx="0" cy="0"/>
         </a:xfrm>
       </p:grpSpPr>
-      <p:pic>
-        <p:nvPicPr>
-          <p:cNvPr id="5" name="内容占位符 4">
-            <a:extLst>
-              <a:ext uri="{FF2B5EF4-FFF2-40B4-BE49-F238E27FC236}">
-                <a16:creationId xmlns:a16="http://schemas.microsoft.com/office/drawing/2014/main" id="{AE67CEEB-9D52-13CE-C6BF-C3787B418D67}"/>
-              </a:ext>
-            </a:extLst>
-          </p:cNvPr>
-          <p:cNvPicPr>
-            <a:picLocks noGrp="1" noChangeAspect="1"/>
-          </p:cNvPicPr>
-          <p:nvPr>
-            <p:ph sz="half" idx="1"/>
-          </p:nvPr>
-        </p:nvPicPr>
-        <p:blipFill rotWithShape="1">
-          <a:blip r:embed="rId3"/>
-          <a:srcRect t="5767" r="4896"/>
-          <a:stretch/>
-        </p:blipFill>
-        <p:spPr>
-          <a:xfrm>
-            <a:off x="429266" y="1864636"/>
-            <a:ext cx="6031919" cy="5098220"/>
-          </a:xfrm>
-        </p:spPr>
-      </p:pic>
       <p:sp>
         <p:nvSpPr>
           <p:cNvPr id="4" name="内容占位符 3">
@@ -7344,6 +7316,34 @@
           </a:p>
         </p:txBody>
       </p:sp>
+      <p:pic>
+        <p:nvPicPr>
+          <p:cNvPr id="8" name="内容占位符 7">
+            <a:extLst>
+              <a:ext uri="{FF2B5EF4-FFF2-40B4-BE49-F238E27FC236}">
+                <a16:creationId xmlns:a16="http://schemas.microsoft.com/office/drawing/2014/main" id="{C400574D-1692-A187-9484-03FDEE7B73F3}"/>
+              </a:ext>
+            </a:extLst>
+          </p:cNvPr>
+          <p:cNvPicPr>
+            <a:picLocks noGrp="1" noChangeAspect="1"/>
+          </p:cNvPicPr>
+          <p:nvPr>
+            <p:ph sz="half" idx="1"/>
+          </p:nvPr>
+        </p:nvPicPr>
+        <p:blipFill rotWithShape="1">
+          <a:blip r:embed="rId3"/>
+          <a:srcRect l="9935" t="10785" r="6564" b="4729"/>
+          <a:stretch/>
+        </p:blipFill>
+        <p:spPr>
+          <a:xfrm>
+            <a:off x="226740" y="1901111"/>
+            <a:ext cx="6201181" cy="4705787"/>
+          </a:xfrm>
+        </p:spPr>
+      </p:pic>
     </p:spTree>
     <p:extLst>
       <p:ext uri="{BB962C8B-B14F-4D97-AF65-F5344CB8AC3E}">

</xml_diff>